<commit_message>
Mise a jour de la diapo
</commit_message>
<xml_diff>
--- a/RapportProjet/Projet Brainwaves.pptx
+++ b/RapportProjet/Projet Brainwaves.pptx
@@ -127,6 +127,11 @@
       </a:defRPr>
     </a:lvl9pPr>
   </p:defaultTextStyle>
+  <p:extLst>
+    <p:ext uri="{EFAFB233-063F-42B5-8137-9DF3F51BA10A}">
+      <p15:sldGuideLst xmlns:p15="http://schemas.microsoft.com/office/powerpoint/2012/main"/>
+    </p:ext>
+  </p:extLst>
 </p:presentation>
 </file>
 
@@ -6620,7 +6625,7 @@
           <a:p>
             <a:r>
               <a:rPr lang="fr-FR" dirty="0" smtClean="0"/>
-              <a:t>Apprentissage des </a:t>
+              <a:t>Compréhension des </a:t>
             </a:r>
             <a:r>
               <a:rPr lang="fr-FR" dirty="0" err="1" smtClean="0"/>
@@ -6706,17 +6711,18 @@
         <p:spPr/>
         <p:txBody>
           <a:bodyPr>
-            <a:normAutofit fontScale="90000"/>
+            <a:normAutofit/>
           </a:bodyPr>
           <a:lstStyle/>
           <a:p>
             <a:r>
               <a:rPr lang="fr-FR" dirty="0"/>
-              <a:t>Interprétation lisible des données</a:t>
-            </a:r>
-            <a:br>
-              <a:rPr lang="fr-FR" dirty="0"/>
-            </a:br>
+              <a:t>Interprétation lisible des </a:t>
+            </a:r>
+            <a:r>
+              <a:rPr lang="fr-FR" dirty="0" smtClean="0"/>
+              <a:t>données</a:t>
+            </a:r>
             <a:r>
               <a:rPr lang="fr-FR" dirty="0"/>
               <a:t/>
@@ -6971,32 +6977,19 @@
         <p:spPr/>
         <p:txBody>
           <a:bodyPr>
-            <a:normAutofit fontScale="90000"/>
+            <a:normAutofit/>
           </a:bodyPr>
           <a:lstStyle/>
           <a:p>
             <a:pPr algn="ctr"/>
             <a:r>
               <a:rPr lang="fr-FR" dirty="0"/>
-              <a:t>Menu Paramètres</a:t>
-            </a:r>
-            <a:br>
-              <a:rPr lang="fr-FR" dirty="0"/>
-            </a:br>
-            <a:r>
-              <a:rPr lang="fr-FR" dirty="0"/>
-              <a:t/>
-            </a:r>
-            <a:br>
-              <a:rPr lang="fr-FR" dirty="0"/>
-            </a:br>
-            <a:r>
-              <a:rPr lang="fr-FR" dirty="0"/>
-              <a:t/>
-            </a:r>
-            <a:br>
-              <a:rPr lang="fr-FR" dirty="0"/>
-            </a:br>
+              <a:t>Menu </a:t>
+            </a:r>
+            <a:r>
+              <a:rPr lang="fr-FR" dirty="0" smtClean="0"/>
+              <a:t>Paramètres</a:t>
+            </a:r>
             <a:endParaRPr lang="fr-FR" dirty="0"/>
           </a:p>
         </p:txBody>
@@ -7231,18 +7224,19 @@
         <p:spPr/>
         <p:txBody>
           <a:bodyPr>
-            <a:normAutofit fontScale="90000"/>
+            <a:normAutofit/>
           </a:bodyPr>
           <a:lstStyle/>
           <a:p>
             <a:pPr algn="ctr"/>
             <a:r>
               <a:rPr lang="fr-FR" dirty="0"/>
-              <a:t>Enregistrements des courbes en CSV</a:t>
-            </a:r>
-            <a:br>
-              <a:rPr lang="fr-FR" dirty="0"/>
-            </a:br>
+              <a:t>Enregistrements des courbes en </a:t>
+            </a:r>
+            <a:r>
+              <a:rPr lang="fr-FR" dirty="0" smtClean="0"/>
+              <a:t>CSV</a:t>
+            </a:r>
             <a:r>
               <a:rPr lang="fr-FR" dirty="0"/>
               <a:t/>
@@ -7571,7 +7565,7 @@
         <p:spPr>
           <a:xfrm>
             <a:off x="1273184" y="2560878"/>
-            <a:ext cx="7659148" cy="369332"/>
+            <a:ext cx="7659148" cy="1200329"/>
           </a:xfrm>
           <a:prstGeom prst="rect">
             <a:avLst/>
@@ -7591,7 +7585,30 @@
             </a:r>
             <a:r>
               <a:rPr lang="fr-FR" dirty="0" smtClean="0"/>
-              <a:t>de deux courbes</a:t>
+              <a:t>de deux </a:t>
+            </a:r>
+            <a:r>
+              <a:rPr lang="fr-FR" dirty="0" smtClean="0"/>
+              <a:t>courbes</a:t>
+            </a:r>
+          </a:p>
+          <a:p>
+            <a:pPr fontAlgn="base"/>
+            <a:endParaRPr lang="fr-FR" dirty="0"/>
+          </a:p>
+          <a:p>
+            <a:pPr fontAlgn="base"/>
+            <a:endParaRPr lang="fr-FR" dirty="0" smtClean="0"/>
+          </a:p>
+          <a:p>
+            <a:pPr fontAlgn="base"/>
+            <a:r>
+              <a:rPr lang="fr-FR" dirty="0" smtClean="0"/>
+              <a:t>Impl</a:t>
+            </a:r>
+            <a:r>
+              <a:rPr lang="fr-FR" dirty="0" smtClean="0"/>
+              <a:t>émentation de la régularisation de courbes</a:t>
             </a:r>
             <a:endParaRPr lang="fr-FR" dirty="0"/>
           </a:p>
@@ -7650,22 +7667,19 @@
         <p:spPr/>
         <p:txBody>
           <a:bodyPr>
-            <a:normAutofit fontScale="90000"/>
+            <a:normAutofit/>
           </a:bodyPr>
           <a:lstStyle/>
           <a:p>
             <a:pPr algn="ctr"/>
             <a:r>
               <a:rPr lang="fr-FR" dirty="0"/>
-              <a:t>Problèmes rencontrés</a:t>
-            </a:r>
-            <a:r>
-              <a:rPr lang="fr-FR" dirty="0"/>
-              <a:t/>
-            </a:r>
-            <a:br>
-              <a:rPr lang="fr-FR" dirty="0"/>
-            </a:br>
+              <a:t>Problèmes </a:t>
+            </a:r>
+            <a:r>
+              <a:rPr lang="fr-FR" dirty="0" smtClean="0"/>
+              <a:t>rencontrés</a:t>
+            </a:r>
             <a:r>
               <a:rPr lang="fr-FR" dirty="0"/>
               <a:t/>
@@ -7810,8 +7824,9 @@
             </a:pPr>
             <a:r>
               <a:rPr lang="fr-FR" dirty="0" smtClean="0"/>
-              <a:t>	conflits </a:t>
-            </a:r>
+              <a:t>conflits </a:t>
+            </a:r>
+            <a:endParaRPr lang="fr-FR" dirty="0" smtClean="0"/>
           </a:p>
           <a:p>
             <a:pPr marL="285750" indent="-285750">
@@ -7819,10 +7834,6 @@
               <a:buChar char="•"/>
             </a:pPr>
             <a:r>
-              <a:rPr lang="fr-FR" dirty="0" smtClean="0"/>
-              <a:t>	</a:t>
-            </a:r>
-            <a:r>
               <a:rPr lang="fr-FR" dirty="0" err="1" smtClean="0"/>
               <a:t>merge</a:t>
             </a:r>
@@ -7834,7 +7845,6 @@
               <a:rPr lang="fr-FR" dirty="0"/>
               <a:t>des branches </a:t>
             </a:r>
-            <a:endParaRPr lang="fr-FR" dirty="0"/>
           </a:p>
           <a:p>
             <a:pPr marL="285750" indent="-285750">
@@ -7843,7 +7853,11 @@
             </a:pPr>
             <a:r>
               <a:rPr lang="fr-FR" dirty="0" smtClean="0"/>
-              <a:t>	diverses erreurs</a:t>
+              <a:t>diverses </a:t>
+            </a:r>
+            <a:r>
+              <a:rPr lang="fr-FR" dirty="0" smtClean="0"/>
+              <a:t>erreurs</a:t>
             </a:r>
           </a:p>
           <a:p>
@@ -7870,20 +7884,12 @@
               <a:buChar char="•"/>
             </a:pPr>
             <a:r>
-              <a:rPr lang="fr-FR" dirty="0"/>
-              <a:t>	</a:t>
-            </a:r>
-            <a:r>
               <a:rPr lang="fr-FR" dirty="0" smtClean="0"/>
               <a:t>signification </a:t>
             </a:r>
             <a:r>
               <a:rPr lang="fr-FR" dirty="0"/>
-              <a:t>des ondes </a:t>
-            </a:r>
-            <a:r>
-              <a:rPr lang="fr-FR" dirty="0"/>
-              <a:t>/</a:t>
+              <a:t>des ondes /</a:t>
             </a:r>
             <a:r>
               <a:rPr lang="fr-FR" dirty="0" smtClean="0"/>
@@ -7922,10 +7928,6 @@
               <a:buChar char="•"/>
             </a:pPr>
             <a:r>
-              <a:rPr lang="fr-FR" dirty="0"/>
-              <a:t>	</a:t>
-            </a:r>
-            <a:r>
               <a:rPr lang="fr-FR" dirty="0" smtClean="0"/>
               <a:t>manque </a:t>
             </a:r>
@@ -7933,7 +7935,6 @@
               <a:rPr lang="fr-FR" dirty="0"/>
               <a:t>conséquent de documentation </a:t>
             </a:r>
-            <a:endParaRPr lang="fr-FR" dirty="0"/>
           </a:p>
           <a:p>
             <a:pPr marL="285750" indent="-285750">
@@ -7942,13 +7943,12 @@
             </a:pPr>
             <a:r>
               <a:rPr lang="fr-FR" dirty="0" smtClean="0"/>
-              <a:t>	application </a:t>
+              <a:t>application </a:t>
             </a:r>
             <a:r>
               <a:rPr lang="fr-FR" dirty="0"/>
               <a:t>technique difficile </a:t>
             </a:r>
-            <a:endParaRPr lang="fr-FR" dirty="0"/>
           </a:p>
           <a:p>
             <a:pPr marL="285750" indent="-285750">
@@ -7957,7 +7957,7 @@
             </a:pPr>
             <a:r>
               <a:rPr lang="fr-FR" dirty="0" smtClean="0"/>
-              <a:t>	manque </a:t>
+              <a:t>manque </a:t>
             </a:r>
             <a:r>
               <a:rPr lang="fr-FR" dirty="0"/>
@@ -8024,7 +8024,7 @@
         <p:spPr/>
         <p:txBody>
           <a:bodyPr>
-            <a:normAutofit fontScale="90000"/>
+            <a:normAutofit/>
           </a:bodyPr>
           <a:lstStyle/>
           <a:p>
@@ -8037,20 +8037,6 @@
               <a:rPr lang="fr-FR" dirty="0" smtClean="0"/>
               <a:t>proposées</a:t>
             </a:r>
-            <a:r>
-              <a:rPr lang="fr-FR" dirty="0"/>
-              <a:t/>
-            </a:r>
-            <a:br>
-              <a:rPr lang="fr-FR" dirty="0"/>
-            </a:br>
-            <a:r>
-              <a:rPr lang="fr-FR" dirty="0"/>
-              <a:t/>
-            </a:r>
-            <a:br>
-              <a:rPr lang="fr-FR" dirty="0"/>
-            </a:br>
             <a:endParaRPr lang="fr-FR" dirty="0"/>
           </a:p>
         </p:txBody>
@@ -8157,8 +8143,8 @@
         </p:nvSpPr>
         <p:spPr>
           <a:xfrm>
-            <a:off x="2614167" y="1283245"/>
-            <a:ext cx="6065240" cy="4801314"/>
+            <a:off x="2614166" y="1283245"/>
+            <a:ext cx="6940032" cy="4247317"/>
           </a:xfrm>
           <a:prstGeom prst="rect">
             <a:avLst/>
@@ -8190,7 +8176,7 @@
             </a:pPr>
             <a:r>
               <a:rPr lang="fr-FR" dirty="0" smtClean="0"/>
-              <a:t>	Longues </a:t>
+              <a:t>Longues </a:t>
             </a:r>
             <a:r>
               <a:rPr lang="fr-FR" dirty="0"/>
@@ -8204,16 +8190,12 @@
               <a:buChar char="•"/>
             </a:pPr>
             <a:r>
+              <a:rPr lang="fr-FR" dirty="0" smtClean="0"/>
+              <a:t>Différents essais </a:t>
+            </a:r>
+            <a:r>
               <a:rPr lang="fr-FR" dirty="0"/>
-              <a:t>	</a:t>
-            </a:r>
-            <a:r>
-              <a:rPr lang="fr-FR" dirty="0" smtClean="0"/>
-              <a:t>Différent </a:t>
-            </a:r>
-            <a:r>
-              <a:rPr lang="fr-FR" dirty="0"/>
-              <a:t>essai pour résoudre les problèmes </a:t>
+              <a:t>pour résoudre les problèmes </a:t>
             </a:r>
             <a:endParaRPr lang="fr-FR" dirty="0" smtClean="0"/>
           </a:p>
@@ -8245,11 +8227,7 @@
             </a:pPr>
             <a:r>
               <a:rPr lang="fr-FR" dirty="0" smtClean="0"/>
-              <a:t>	</a:t>
-            </a:r>
-            <a:r>
-              <a:rPr lang="fr-FR" dirty="0"/>
-              <a:t> Recherche </a:t>
+              <a:t>Recherche </a:t>
             </a:r>
             <a:r>
               <a:rPr lang="fr-FR" dirty="0" smtClean="0"/>
@@ -8270,10 +8248,6 @@
               <a:buChar char="•"/>
             </a:pPr>
             <a:r>
-              <a:rPr lang="fr-FR" dirty="0"/>
-              <a:t>	</a:t>
-            </a:r>
-            <a:r>
               <a:rPr lang="fr-FR" dirty="0" smtClean="0"/>
               <a:t>Faible </a:t>
             </a:r>
@@ -8307,17 +8281,18 @@
               <a:buChar char="•"/>
             </a:pPr>
             <a:r>
-              <a:rPr lang="fr-FR" dirty="0"/>
-              <a:t>	</a:t>
-            </a:r>
-            <a:r>
-              <a:rPr lang="fr-FR" dirty="0"/>
-              <a:t> </a:t>
-            </a:r>
-            <a:r>
               <a:rPr lang="fr-FR" dirty="0" smtClean="0"/>
-              <a:t>Début de Recherche</a:t>
-            </a:r>
+              <a:t>Début </a:t>
+            </a:r>
+            <a:r>
+              <a:rPr lang="fr-FR" dirty="0" smtClean="0"/>
+              <a:t>de </a:t>
+            </a:r>
+            <a:r>
+              <a:rPr lang="fr-FR" dirty="0" smtClean="0"/>
+              <a:t>recherche</a:t>
+            </a:r>
+            <a:endParaRPr lang="fr-FR" dirty="0" smtClean="0"/>
           </a:p>
           <a:p>
             <a:pPr marL="285750" indent="-285750">
@@ -8325,10 +8300,6 @@
               <a:buChar char="•"/>
             </a:pPr>
             <a:r>
-              <a:rPr lang="fr-FR" dirty="0"/>
-              <a:t>	 </a:t>
-            </a:r>
-            <a:r>
               <a:rPr lang="fr-FR" dirty="0" smtClean="0"/>
               <a:t>Problème </a:t>
             </a:r>
@@ -8338,7 +8309,7 @@
             </a:r>
             <a:r>
               <a:rPr lang="fr-FR" dirty="0" smtClean="0"/>
-              <a:t>conséquent </a:t>
+              <a:t>conséquent</a:t>
             </a:r>
             <a:endParaRPr lang="fr-FR" dirty="0"/>
           </a:p>
@@ -8349,7 +8320,7 @@
             </a:pPr>
             <a:r>
               <a:rPr lang="fr-FR" dirty="0" smtClean="0"/>
-              <a:t>	 Manque </a:t>
+              <a:t>Manque </a:t>
             </a:r>
             <a:r>
               <a:rPr lang="fr-FR" dirty="0"/>
@@ -8840,22 +8811,19 @@
         <p:spPr/>
         <p:txBody>
           <a:bodyPr>
-            <a:normAutofit fontScale="90000"/>
+            <a:normAutofit/>
           </a:bodyPr>
           <a:lstStyle/>
           <a:p>
             <a:pPr algn="ctr"/>
             <a:r>
               <a:rPr lang="fr-FR" dirty="0" smtClean="0"/>
-              <a:t>Améliorations possibles</a:t>
-            </a:r>
-            <a:r>
-              <a:rPr lang="fr-FR" dirty="0"/>
-              <a:t/>
-            </a:r>
-            <a:br>
-              <a:rPr lang="fr-FR" dirty="0"/>
-            </a:br>
+              <a:t>Améliorations </a:t>
+            </a:r>
+            <a:r>
+              <a:rPr lang="fr-FR" dirty="0" smtClean="0"/>
+              <a:t>possibles</a:t>
+            </a:r>
             <a:r>
               <a:rPr lang="fr-FR" dirty="0"/>
               <a:t/>
@@ -8970,7 +8938,7 @@
         <p:spPr>
           <a:xfrm>
             <a:off x="2214694" y="2055303"/>
-            <a:ext cx="5704513" cy="2862322"/>
+            <a:ext cx="5704513" cy="3693319"/>
           </a:xfrm>
           <a:prstGeom prst="rect">
             <a:avLst/>
@@ -8985,8 +8953,25 @@
           <a:p>
             <a:r>
               <a:rPr lang="fr-FR" dirty="0" smtClean="0"/>
-              <a:t>Comparaison des enregistrements</a:t>
-            </a:r>
+              <a:t>Comparaison des </a:t>
+            </a:r>
+            <a:r>
+              <a:rPr lang="fr-FR" dirty="0" smtClean="0"/>
+              <a:t>enregistrements</a:t>
+            </a:r>
+          </a:p>
+          <a:p>
+            <a:endParaRPr lang="fr-FR" dirty="0" smtClean="0"/>
+          </a:p>
+          <a:p>
+            <a:endParaRPr lang="fr-FR" dirty="0"/>
+          </a:p>
+          <a:p>
+            <a:r>
+              <a:rPr lang="fr-FR" dirty="0" smtClean="0"/>
+              <a:t>Affichage des courbes régularisées</a:t>
+            </a:r>
+            <a:endParaRPr lang="fr-FR" dirty="0" smtClean="0"/>
           </a:p>
           <a:p>
             <a:endParaRPr lang="fr-FR" dirty="0" smtClean="0"/>
@@ -9435,7 +9420,7 @@
         </p:nvSpPr>
         <p:spPr>
           <a:xfrm>
-            <a:off x="1661357" y="1930400"/>
+            <a:off x="2635577" y="1930400"/>
             <a:ext cx="6929306" cy="3970318"/>
           </a:xfrm>
           <a:prstGeom prst="rect">
@@ -9595,32 +9580,15 @@
         <p:spPr/>
         <p:txBody>
           <a:bodyPr>
-            <a:normAutofit fontScale="90000"/>
+            <a:normAutofit/>
           </a:bodyPr>
           <a:lstStyle/>
           <a:p>
             <a:pPr algn="ctr"/>
             <a:r>
-              <a:rPr lang="fr-FR" dirty="0"/>
+              <a:rPr lang="fr-FR" dirty="0" smtClean="0"/>
               <a:t>Remerciements</a:t>
             </a:r>
-            <a:br>
-              <a:rPr lang="fr-FR" dirty="0"/>
-            </a:br>
-            <a:r>
-              <a:rPr lang="fr-FR" dirty="0"/>
-              <a:t/>
-            </a:r>
-            <a:br>
-              <a:rPr lang="fr-FR" dirty="0"/>
-            </a:br>
-            <a:r>
-              <a:rPr lang="fr-FR" dirty="0"/>
-              <a:t/>
-            </a:r>
-            <a:br>
-              <a:rPr lang="fr-FR" dirty="0"/>
-            </a:br>
             <a:endParaRPr lang="fr-FR" dirty="0"/>
           </a:p>
         </p:txBody>
@@ -9711,11 +9679,6 @@
               </a:rPr>
               <a:t>CONCLUSION</a:t>
             </a:r>
-            <a:endParaRPr lang="fr-FR" sz="2800" b="1" dirty="0">
-              <a:solidFill>
-                <a:schemeClr val="bg2"/>
-              </a:solidFill>
-            </a:endParaRPr>
           </a:p>
         </p:txBody>
       </p:sp>
@@ -10124,8 +10087,12 @@
           <a:p>
             <a:pPr algn="ctr"/>
             <a:r>
+              <a:rPr lang="fr-FR" sz="4000" dirty="0"/>
+              <a:t>Equipe</a:t>
+            </a:r>
+            <a:r>
               <a:rPr lang="fr-FR" dirty="0"/>
-              <a:t>Equipe</a:t>
+              <a:t/>
             </a:r>
             <a:br>
               <a:rPr lang="fr-FR" dirty="0"/>
@@ -10574,25 +10541,19 @@
         <p:spPr/>
         <p:txBody>
           <a:bodyPr>
-            <a:normAutofit fontScale="90000"/>
+            <a:normAutofit/>
           </a:bodyPr>
           <a:lstStyle/>
           <a:p>
             <a:pPr algn="ctr"/>
             <a:r>
               <a:rPr lang="fr-FR" dirty="0"/>
-              <a:t>Outils utilisés</a:t>
-            </a:r>
-            <a:br>
-              <a:rPr lang="fr-FR" dirty="0"/>
-            </a:br>
-            <a:r>
-              <a:rPr lang="fr-FR" dirty="0"/>
-              <a:t/>
-            </a:r>
-            <a:br>
-              <a:rPr lang="fr-FR" dirty="0"/>
-            </a:br>
+              <a:t>Outils </a:t>
+            </a:r>
+            <a:r>
+              <a:rPr lang="fr-FR" dirty="0" smtClean="0"/>
+              <a:t>utilisés</a:t>
+            </a:r>
             <a:endParaRPr lang="fr-FR" dirty="0"/>
           </a:p>
         </p:txBody>
@@ -10847,13 +10808,6 @@
               <a:rPr lang="fr-FR" dirty="0" smtClean="0"/>
               <a:t>Objectifs</a:t>
             </a:r>
-            <a:r>
-              <a:rPr lang="fr-FR" dirty="0"/>
-              <a:t/>
-            </a:r>
-            <a:br>
-              <a:rPr lang="fr-FR" dirty="0"/>
-            </a:br>
             <a:endParaRPr lang="fr-FR" dirty="0"/>
           </a:p>
         </p:txBody>
@@ -11305,7 +11259,11 @@
           <a:p>
             <a:r>
               <a:rPr lang="fr-FR" dirty="0" smtClean="0"/>
-              <a:t>Grande fonctionnalité de Bluetooth :</a:t>
+              <a:t>Options de </a:t>
+            </a:r>
+            <a:r>
+              <a:rPr lang="fr-FR" dirty="0" smtClean="0"/>
+              <a:t>Bluetooth :</a:t>
             </a:r>
           </a:p>
           <a:p>
@@ -11369,18 +11327,19 @@
         <p:spPr/>
         <p:txBody>
           <a:bodyPr>
-            <a:normAutofit fontScale="90000"/>
+            <a:normAutofit/>
           </a:bodyPr>
           <a:lstStyle/>
           <a:p>
             <a:pPr algn="ctr"/>
             <a:r>
               <a:rPr lang="fr-FR" dirty="0"/>
-              <a:t>Connexion Bluetooth au capteur</a:t>
-            </a:r>
-            <a:br>
-              <a:rPr lang="fr-FR" dirty="0"/>
-            </a:br>
+              <a:t>Connexion Bluetooth au </a:t>
+            </a:r>
+            <a:r>
+              <a:rPr lang="fr-FR" dirty="0" smtClean="0"/>
+              <a:t>capteur</a:t>
+            </a:r>
             <a:r>
               <a:rPr lang="fr-FR" dirty="0"/>
               <a:t/>

</xml_diff>